<commit_message>
[ADD] call for candidates update
</commit_message>
<xml_diff>
--- a/tweet_data/media/election/call_for_candidates.pptx
+++ b/tweet_data/media/election/call_for_candidates.pptx
@@ -214,7 +214,7 @@
           <a:p>
             <a:fld id="{762B48F5-BACC-47D6-A0F7-82FBF9C6BC85}" type="datetimeFigureOut">
               <a:rPr lang="en-US"/>
-              <a:t>9/30/2021</a:t>
+              <a:t>11/18/2021</a:t>
             </a:fld>
             <a:endParaRPr/>
           </a:p>
@@ -379,7 +379,7 @@
           <a:p>
             <a:fld id="{0CB1CD00-5424-4675-AB18-2C419B060449}" type="datetimeFigureOut">
               <a:rPr lang="en-US"/>
-              <a:t>9/30/2021</a:t>
+              <a:t>11/18/2021</a:t>
             </a:fld>
             <a:endParaRPr/>
           </a:p>
@@ -1016,7 +1016,7 @@
           <a:p>
             <a:fld id="{37CC0096-1860-4642-9CD2-0079EA5E7CD1}" type="datetimeFigureOut">
               <a:rPr lang="en-US" smtClean="0"/>
-              <a:t>9/30/2021</a:t>
+              <a:t>11/18/2021</a:t>
             </a:fld>
             <a:endParaRPr lang="en-US"/>
           </a:p>
@@ -1196,7 +1196,7 @@
           <a:p>
             <a:fld id="{37CC0096-1860-4642-9CD2-0079EA5E7CD1}" type="datetimeFigureOut">
               <a:rPr lang="en-US" smtClean="0"/>
-              <a:t>9/30/2021</a:t>
+              <a:t>11/18/2021</a:t>
             </a:fld>
             <a:endParaRPr lang="en-US"/>
           </a:p>
@@ -1370,7 +1370,7 @@
           <a:p>
             <a:fld id="{37CC0096-1860-4642-9CD2-0079EA5E7CD1}" type="datetimeFigureOut">
               <a:rPr lang="en-US" smtClean="0"/>
-              <a:t>9/30/2021</a:t>
+              <a:t>11/18/2021</a:t>
             </a:fld>
             <a:endParaRPr lang="en-US"/>
           </a:p>
@@ -1805,7 +1805,7 @@
           <a:p>
             <a:fld id="{37CC0096-1860-4642-9CD2-0079EA5E7CD1}" type="datetimeFigureOut">
               <a:rPr lang="en-US" smtClean="0"/>
-              <a:t>9/30/2021</a:t>
+              <a:t>11/18/2021</a:t>
             </a:fld>
             <a:endParaRPr lang="en-US"/>
           </a:p>
@@ -2245,7 +2245,7 @@
           <a:p>
             <a:fld id="{37CC0096-1860-4642-9CD2-0079EA5E7CD1}" type="datetimeFigureOut">
               <a:rPr lang="en-US" smtClean="0"/>
-              <a:t>9/30/2021</a:t>
+              <a:t>11/18/2021</a:t>
             </a:fld>
             <a:endParaRPr lang="en-US"/>
           </a:p>
@@ -2363,7 +2363,7 @@
           <a:p>
             <a:fld id="{37CC0096-1860-4642-9CD2-0079EA5E7CD1}" type="datetimeFigureOut">
               <a:rPr lang="en-US" smtClean="0"/>
-              <a:t>9/30/2021</a:t>
+              <a:t>11/18/2021</a:t>
             </a:fld>
             <a:endParaRPr lang="en-US"/>
           </a:p>
@@ -2458,7 +2458,7 @@
           <a:p>
             <a:fld id="{37CC0096-1860-4642-9CD2-0079EA5E7CD1}" type="datetimeFigureOut">
               <a:rPr lang="en-US" smtClean="0"/>
-              <a:t>9/30/2021</a:t>
+              <a:t>11/18/2021</a:t>
             </a:fld>
             <a:endParaRPr lang="en-US"/>
           </a:p>
@@ -2742,7 +2742,7 @@
           <a:p>
             <a:fld id="{37CC0096-1860-4642-9CD2-0079EA5E7CD1}" type="datetimeFigureOut">
               <a:rPr lang="en-US" smtClean="0"/>
-              <a:t>9/30/2021</a:t>
+              <a:t>11/18/2021</a:t>
             </a:fld>
             <a:endParaRPr lang="en-US"/>
           </a:p>
@@ -3055,7 +3055,7 @@
           <a:p>
             <a:fld id="{37CC0096-1860-4642-9CD2-0079EA5E7CD1}" type="datetimeFigureOut">
               <a:rPr lang="en-US" smtClean="0"/>
-              <a:t>9/30/2021</a:t>
+              <a:t>11/18/2021</a:t>
             </a:fld>
             <a:endParaRPr lang="en-US"/>
           </a:p>
@@ -3317,7 +3317,7 @@
             <a:fld id="{37CC0096-1860-4642-9CD2-0079EA5E7CD1}" type="datetimeFigureOut">
               <a:rPr lang="en-US" smtClean="0"/>
               <a:pPr/>
-              <a:t>9/30/2021</a:t>
+              <a:t>11/18/2021</a:t>
             </a:fld>
             <a:endParaRPr lang="en-US"/>
           </a:p>
@@ -3921,7 +3921,55 @@
                   <a:schemeClr val="accent3"/>
                 </a:solidFill>
               </a:rPr>
-              <a:t>Thursday 30th September at 12 PM PST, 2021</a:t>
+              <a:t>Thursday </a:t>
+            </a:r>
+            <a:r>
+              <a:rPr lang="en-US" dirty="0" smtClean="0">
+                <a:solidFill>
+                  <a:schemeClr val="accent3"/>
+                </a:solidFill>
+              </a:rPr>
+              <a:t>18</a:t>
+            </a:r>
+            <a:r>
+              <a:rPr lang="en-US" baseline="30000" dirty="0" smtClean="0">
+                <a:solidFill>
+                  <a:schemeClr val="accent3"/>
+                </a:solidFill>
+              </a:rPr>
+              <a:t>th</a:t>
+            </a:r>
+            <a:r>
+              <a:rPr lang="en-US" dirty="0" smtClean="0">
+                <a:solidFill>
+                  <a:schemeClr val="accent3"/>
+                </a:solidFill>
+              </a:rPr>
+              <a:t> November </a:t>
+            </a:r>
+            <a:r>
+              <a:rPr lang="en-US" dirty="0">
+                <a:solidFill>
+                  <a:schemeClr val="accent3"/>
+                </a:solidFill>
+              </a:rPr>
+              <a:t>at 12 </a:t>
+            </a:r>
+            <a:r>
+              <a:rPr lang="en-US" dirty="0" smtClean="0">
+                <a:solidFill>
+                  <a:schemeClr val="accent3"/>
+                </a:solidFill>
+              </a:rPr>
+              <a:t>AM </a:t>
+            </a:r>
+            <a:r>
+              <a:rPr lang="en-US" dirty="0">
+                <a:solidFill>
+                  <a:schemeClr val="accent3"/>
+                </a:solidFill>
+              </a:rPr>
+              <a:t>PST, 2021</a:t>
             </a:r>
             <a:r>
               <a:rPr lang="en-US" dirty="0">
@@ -4031,7 +4079,23 @@
                   <a:schemeClr val="accent3"/>
                 </a:solidFill>
               </a:rPr>
-              <a:t>CLOSE at Midnight PST, Wednesday, October 6th</a:t>
+              <a:t>CLOSE at Midnight PST, Wednesday, </a:t>
+            </a:r>
+            <a:r>
+              <a:rPr lang="en-US" dirty="0" smtClean="0">
+                <a:solidFill>
+                  <a:schemeClr val="accent3"/>
+                </a:solidFill>
+              </a:rPr>
+              <a:t>November 25th</a:t>
+            </a:r>
+            <a:r>
+              <a:rPr lang="en-US" dirty="0" smtClean="0">
+                <a:solidFill>
+                  <a:schemeClr val="tx1"/>
+                </a:solidFill>
+              </a:rPr>
+              <a:t> </a:t>
             </a:r>
             <a:r>
               <a:rPr lang="en-US" dirty="0">
@@ -4039,7 +4103,23 @@
                   <a:schemeClr val="tx1"/>
                 </a:solidFill>
               </a:rPr>
-              <a:t> (Midnight PST the Night Of The 6th). No candidates will be considered who enter AFTER that time. </a:t>
+              <a:t>(Midnight PST the Night Of The </a:t>
+            </a:r>
+            <a:r>
+              <a:rPr lang="en-US" dirty="0" smtClean="0">
+                <a:solidFill>
+                  <a:schemeClr val="tx1"/>
+                </a:solidFill>
+              </a:rPr>
+              <a:t>25th</a:t>
+            </a:r>
+            <a:r>
+              <a:rPr lang="en-US" dirty="0">
+                <a:solidFill>
+                  <a:schemeClr val="tx1"/>
+                </a:solidFill>
+              </a:rPr>
+              <a:t>). No candidates will be considered who enter AFTER that time. </a:t>
             </a:r>
             <a:r>
               <a:rPr lang="en-US" dirty="0" smtClean="0">

</xml_diff>